<commit_message>
Updates CAEX 2.15 metamodel due to inconsistency
Set multiplicity of reference RoleRequirements.roleClass to [0..1]
(instead of [1..1]) in correspondence with the attribute
RoleRequirements.refBaseRoleClassPath [0..1]
</commit_message>
<xml_diff>
--- a/documentation/CAEX215/CAEX215-Metamodel-Documentation.pptx
+++ b/documentation/CAEX215/CAEX215-Metamodel-Documentation.pptx
@@ -113,6 +113,11 @@
       </a:defRPr>
     </a:lvl9pPr>
   </p:defaultTextStyle>
+  <p:extLst>
+    <p:ext uri="{EFAFB233-063F-42B5-8137-9DF3F51BA10A}">
+      <p15:sldGuideLst xmlns:p15="http://schemas.microsoft.com/office/powerpoint/2012/main"/>
+    </p:ext>
+  </p:extLst>
 </p:presentation>
 </file>
 
@@ -247,7 +252,7 @@
           <a:p>
             <a:fld id="{E76C5E42-C277-4BC7-A563-3C66F65ACB3D}" type="datetimeFigureOut">
               <a:rPr lang="en-US" smtClean="0"/>
-              <a:t>8/9/2017</a:t>
+              <a:t>8/11/2017</a:t>
             </a:fld>
             <a:endParaRPr lang="en-US"/>
           </a:p>
@@ -417,7 +422,7 @@
           <a:p>
             <a:fld id="{E76C5E42-C277-4BC7-A563-3C66F65ACB3D}" type="datetimeFigureOut">
               <a:rPr lang="en-US" smtClean="0"/>
-              <a:t>8/9/2017</a:t>
+              <a:t>8/11/2017</a:t>
             </a:fld>
             <a:endParaRPr lang="en-US"/>
           </a:p>
@@ -597,7 +602,7 @@
           <a:p>
             <a:fld id="{E76C5E42-C277-4BC7-A563-3C66F65ACB3D}" type="datetimeFigureOut">
               <a:rPr lang="en-US" smtClean="0"/>
-              <a:t>8/9/2017</a:t>
+              <a:t>8/11/2017</a:t>
             </a:fld>
             <a:endParaRPr lang="en-US"/>
           </a:p>
@@ -958,7 +963,7 @@
           <a:p>
             <a:fld id="{E76C5E42-C277-4BC7-A563-3C66F65ACB3D}" type="datetimeFigureOut">
               <a:rPr lang="en-US" smtClean="0"/>
-              <a:t>8/9/2017</a:t>
+              <a:t>8/11/2017</a:t>
             </a:fld>
             <a:endParaRPr lang="en-US"/>
           </a:p>
@@ -1190,7 +1195,7 @@
           <a:p>
             <a:fld id="{E76C5E42-C277-4BC7-A563-3C66F65ACB3D}" type="datetimeFigureOut">
               <a:rPr lang="en-US" smtClean="0"/>
-              <a:t>8/9/2017</a:t>
+              <a:t>8/11/2017</a:t>
             </a:fld>
             <a:endParaRPr lang="en-US"/>
           </a:p>
@@ -1557,7 +1562,7 @@
           <a:p>
             <a:fld id="{E76C5E42-C277-4BC7-A563-3C66F65ACB3D}" type="datetimeFigureOut">
               <a:rPr lang="en-US" smtClean="0"/>
-              <a:t>8/9/2017</a:t>
+              <a:t>8/11/2017</a:t>
             </a:fld>
             <a:endParaRPr lang="en-US"/>
           </a:p>
@@ -1675,7 +1680,7 @@
           <a:p>
             <a:fld id="{E76C5E42-C277-4BC7-A563-3C66F65ACB3D}" type="datetimeFigureOut">
               <a:rPr lang="en-US" smtClean="0"/>
-              <a:t>8/9/2017</a:t>
+              <a:t>8/11/2017</a:t>
             </a:fld>
             <a:endParaRPr lang="en-US"/>
           </a:p>
@@ -1770,7 +1775,7 @@
           <a:p>
             <a:fld id="{E76C5E42-C277-4BC7-A563-3C66F65ACB3D}" type="datetimeFigureOut">
               <a:rPr lang="en-US" smtClean="0"/>
-              <a:t>8/9/2017</a:t>
+              <a:t>8/11/2017</a:t>
             </a:fld>
             <a:endParaRPr lang="en-US"/>
           </a:p>
@@ -2047,7 +2052,7 @@
           <a:p>
             <a:fld id="{E76C5E42-C277-4BC7-A563-3C66F65ACB3D}" type="datetimeFigureOut">
               <a:rPr lang="en-US" smtClean="0"/>
-              <a:t>8/9/2017</a:t>
+              <a:t>8/11/2017</a:t>
             </a:fld>
             <a:endParaRPr lang="en-US"/>
           </a:p>
@@ -2300,7 +2305,7 @@
           <a:p>
             <a:fld id="{E76C5E42-C277-4BC7-A563-3C66F65ACB3D}" type="datetimeFigureOut">
               <a:rPr lang="en-US" smtClean="0"/>
-              <a:t>8/9/2017</a:t>
+              <a:t>8/11/2017</a:t>
             </a:fld>
             <a:endParaRPr lang="en-US"/>
           </a:p>
@@ -2513,7 +2518,7 @@
           <a:p>
             <a:fld id="{E76C5E42-C277-4BC7-A563-3C66F65ACB3D}" type="datetimeFigureOut">
               <a:rPr lang="en-US" smtClean="0"/>
-              <a:t>8/9/2017</a:t>
+              <a:t>8/11/2017</a:t>
             </a:fld>
             <a:endParaRPr lang="en-US"/>
           </a:p>
@@ -3593,7 +3598,7 @@
       </p:sp>
       <p:pic>
         <p:nvPicPr>
-          <p:cNvPr id="11" name="Inhaltsplatzhalter 10"/>
+          <p:cNvPr id="4" name="Inhaltsplatzhalter 3"/>
           <p:cNvPicPr>
             <a:picLocks noGrp="1" noChangeAspect="1"/>
           </p:cNvPicPr>
@@ -3615,8 +3620,8 @@
         </p:blipFill>
         <p:spPr>
           <a:xfrm>
-            <a:off x="2460275" y="1058863"/>
-            <a:ext cx="7239699" cy="5559425"/>
+            <a:off x="2459307" y="1058863"/>
+            <a:ext cx="7241635" cy="5559425"/>
           </a:xfrm>
         </p:spPr>
       </p:pic>

</xml_diff>